<commit_message>
Cath history 1 step
</commit_message>
<xml_diff>
--- a/project.pptx
+++ b/project.pptx
@@ -263,7 +263,7 @@
           <a:p>
             <a:fld id="{22653A29-790A-4F7E-AC0B-D03F83546E52}" type="datetimeFigureOut">
               <a:rPr lang="ru-RU" smtClean="0"/>
-              <a:t>15.05.2022</a:t>
+              <a:t>01.06.2022</a:t>
             </a:fld>
             <a:endParaRPr lang="ru-RU"/>
           </a:p>
@@ -461,7 +461,7 @@
           <a:p>
             <a:fld id="{22653A29-790A-4F7E-AC0B-D03F83546E52}" type="datetimeFigureOut">
               <a:rPr lang="ru-RU" smtClean="0"/>
-              <a:t>15.05.2022</a:t>
+              <a:t>01.06.2022</a:t>
             </a:fld>
             <a:endParaRPr lang="ru-RU"/>
           </a:p>
@@ -669,7 +669,7 @@
           <a:p>
             <a:fld id="{22653A29-790A-4F7E-AC0B-D03F83546E52}" type="datetimeFigureOut">
               <a:rPr lang="ru-RU" smtClean="0"/>
-              <a:t>15.05.2022</a:t>
+              <a:t>01.06.2022</a:t>
             </a:fld>
             <a:endParaRPr lang="ru-RU"/>
           </a:p>
@@ -867,7 +867,7 @@
           <a:p>
             <a:fld id="{22653A29-790A-4F7E-AC0B-D03F83546E52}" type="datetimeFigureOut">
               <a:rPr lang="ru-RU" smtClean="0"/>
-              <a:t>15.05.2022</a:t>
+              <a:t>01.06.2022</a:t>
             </a:fld>
             <a:endParaRPr lang="ru-RU"/>
           </a:p>
@@ -1142,7 +1142,7 @@
           <a:p>
             <a:fld id="{22653A29-790A-4F7E-AC0B-D03F83546E52}" type="datetimeFigureOut">
               <a:rPr lang="ru-RU" smtClean="0"/>
-              <a:t>15.05.2022</a:t>
+              <a:t>01.06.2022</a:t>
             </a:fld>
             <a:endParaRPr lang="ru-RU"/>
           </a:p>
@@ -1407,7 +1407,7 @@
           <a:p>
             <a:fld id="{22653A29-790A-4F7E-AC0B-D03F83546E52}" type="datetimeFigureOut">
               <a:rPr lang="ru-RU" smtClean="0"/>
-              <a:t>15.05.2022</a:t>
+              <a:t>01.06.2022</a:t>
             </a:fld>
             <a:endParaRPr lang="ru-RU"/>
           </a:p>
@@ -1819,7 +1819,7 @@
           <a:p>
             <a:fld id="{22653A29-790A-4F7E-AC0B-D03F83546E52}" type="datetimeFigureOut">
               <a:rPr lang="ru-RU" smtClean="0"/>
-              <a:t>15.05.2022</a:t>
+              <a:t>01.06.2022</a:t>
             </a:fld>
             <a:endParaRPr lang="ru-RU"/>
           </a:p>
@@ -1960,7 +1960,7 @@
           <a:p>
             <a:fld id="{22653A29-790A-4F7E-AC0B-D03F83546E52}" type="datetimeFigureOut">
               <a:rPr lang="ru-RU" smtClean="0"/>
-              <a:t>15.05.2022</a:t>
+              <a:t>01.06.2022</a:t>
             </a:fld>
             <a:endParaRPr lang="ru-RU"/>
           </a:p>
@@ -2073,7 +2073,7 @@
           <a:p>
             <a:fld id="{22653A29-790A-4F7E-AC0B-D03F83546E52}" type="datetimeFigureOut">
               <a:rPr lang="ru-RU" smtClean="0"/>
-              <a:t>15.05.2022</a:t>
+              <a:t>01.06.2022</a:t>
             </a:fld>
             <a:endParaRPr lang="ru-RU"/>
           </a:p>
@@ -2384,7 +2384,7 @@
           <a:p>
             <a:fld id="{22653A29-790A-4F7E-AC0B-D03F83546E52}" type="datetimeFigureOut">
               <a:rPr lang="ru-RU" smtClean="0"/>
-              <a:t>15.05.2022</a:t>
+              <a:t>01.06.2022</a:t>
             </a:fld>
             <a:endParaRPr lang="ru-RU"/>
           </a:p>
@@ -2672,7 +2672,7 @@
           <a:p>
             <a:fld id="{22653A29-790A-4F7E-AC0B-D03F83546E52}" type="datetimeFigureOut">
               <a:rPr lang="ru-RU" smtClean="0"/>
-              <a:t>15.05.2022</a:t>
+              <a:t>01.06.2022</a:t>
             </a:fld>
             <a:endParaRPr lang="ru-RU"/>
           </a:p>
@@ -2913,7 +2913,7 @@
           <a:p>
             <a:fld id="{22653A29-790A-4F7E-AC0B-D03F83546E52}" type="datetimeFigureOut">
               <a:rPr lang="ru-RU" smtClean="0"/>
-              <a:t>15.05.2022</a:t>
+              <a:t>01.06.2022</a:t>
             </a:fld>
             <a:endParaRPr lang="ru-RU"/>
           </a:p>
@@ -6891,7 +6891,7 @@
           <a:p>
             <a:pPr algn="ctr"/>
             <a:r>
-              <a:rPr lang="ru-RU" dirty="0" smtClean="0">
+              <a:rPr lang="ru-RU" dirty="0">
                 <a:ln>
                   <a:solidFill>
                     <a:schemeClr val="tx1"/>
@@ -6901,7 +6901,7 @@
               <a:t>Экспорт результатов в </a:t>
             </a:r>
             <a:r>
-              <a:rPr lang="ru-RU" dirty="0" err="1" smtClean="0">
+              <a:rPr lang="ru-RU" dirty="0" err="1">
                 <a:ln>
                   <a:solidFill>
                     <a:schemeClr val="tx1"/>
@@ -7484,7 +7484,7 @@
           <a:p>
             <a:pPr algn="ctr"/>
             <a:r>
-              <a:rPr lang="ru-RU" dirty="0" smtClean="0">
+              <a:rPr lang="ru-RU" dirty="0">
                 <a:ln>
                   <a:solidFill>
                     <a:schemeClr val="tx1"/>
@@ -7494,7 +7494,7 @@
               <a:t>Настройки и результат </a:t>
             </a:r>
             <a:r>
-              <a:rPr lang="ru-RU" dirty="0" err="1" smtClean="0">
+              <a:rPr lang="ru-RU" dirty="0" err="1">
                 <a:ln>
                   <a:solidFill>
                     <a:schemeClr val="tx1"/>
@@ -7737,23 +7737,13 @@
                   </a:solidFill>
                 </a:ln>
               </a:rPr>
-              <a:t>Таблица ВС </a:t>
-            </a:r>
-            <a:r>
-              <a:rPr lang="ru-RU" dirty="0" smtClean="0">
-                <a:ln>
-                  <a:solidFill>
-                    <a:schemeClr val="tx1"/>
-                  </a:solidFill>
-                </a:ln>
-              </a:rPr>
-              <a:t>промрайона.</a:t>
-            </a:r>
-          </a:p>
-          <a:p>
-            <a:pPr algn="ctr"/>
-            <a:r>
-              <a:rPr lang="ru-RU" dirty="0" smtClean="0">
+              <a:t>Таблица ВС промрайона.</a:t>
+            </a:r>
+          </a:p>
+          <a:p>
+            <a:pPr algn="ctr"/>
+            <a:r>
+              <a:rPr lang="ru-RU" dirty="0">
                 <a:ln>
                   <a:solidFill>
                     <a:schemeClr val="tx1"/>
@@ -7766,7 +7756,7 @@
           <a:p>
             <a:pPr algn="ctr"/>
             <a:r>
-              <a:rPr lang="ru-RU" dirty="0" smtClean="0">
+              <a:rPr lang="ru-RU" dirty="0">
                 <a:ln>
                   <a:solidFill>
                     <a:schemeClr val="tx1"/>
@@ -7779,7 +7769,7 @@
           <a:p>
             <a:pPr algn="ctr"/>
             <a:r>
-              <a:rPr lang="ru-RU" dirty="0" smtClean="0">
+              <a:rPr lang="ru-RU" dirty="0">
                 <a:ln>
                   <a:solidFill>
                     <a:schemeClr val="tx1"/>
@@ -7836,7 +7826,7 @@
           <a:p>
             <a:pPr algn="ctr"/>
             <a:r>
-              <a:rPr lang="ru-RU" dirty="0" smtClean="0">
+              <a:rPr lang="ru-RU" dirty="0">
                 <a:ln>
                   <a:solidFill>
                     <a:schemeClr val="tx1"/>
@@ -7845,13 +7835,6 @@
               </a:rPr>
               <a:t>Расчеты коэффициентов</a:t>
             </a:r>
-            <a:endParaRPr lang="ru-RU" dirty="0">
-              <a:ln>
-                <a:solidFill>
-                  <a:schemeClr val="tx1"/>
-                </a:solidFill>
-              </a:ln>
-            </a:endParaRPr>
           </a:p>
         </p:txBody>
       </p:sp>
@@ -7949,7 +7932,7 @@
           <a:p>
             <a:pPr algn="ctr"/>
             <a:r>
-              <a:rPr lang="ru-RU" dirty="0" smtClean="0">
+              <a:rPr lang="ru-RU" dirty="0">
                 <a:ln>
                   <a:solidFill>
                     <a:schemeClr val="tx1"/>
@@ -7958,13 +7941,6 @@
               </a:rPr>
               <a:t>Построение графиков регрессии и истории лова </a:t>
             </a:r>
-            <a:endParaRPr lang="ru-RU" dirty="0">
-              <a:ln>
-                <a:solidFill>
-                  <a:schemeClr val="tx1"/>
-                </a:solidFill>
-              </a:ln>
-            </a:endParaRPr>
           </a:p>
         </p:txBody>
       </p:sp>
@@ -8107,7 +8083,7 @@
           <a:p>
             <a:pPr algn="ctr"/>
             <a:r>
-              <a:rPr lang="ru-RU" dirty="0" smtClean="0">
+              <a:rPr lang="ru-RU" dirty="0">
                 <a:ln>
                   <a:solidFill>
                     <a:schemeClr val="tx1"/>
@@ -8117,7 +8093,7 @@
               <a:t>Составить шаблон файла </a:t>
             </a:r>
             <a:r>
-              <a:rPr lang="ru-RU" dirty="0" err="1" smtClean="0">
+              <a:rPr lang="ru-RU" dirty="0" err="1">
                 <a:ln>
                   <a:solidFill>
                     <a:schemeClr val="tx1"/>
@@ -8127,7 +8103,7 @@
               <a:t>ворд</a:t>
             </a:r>
             <a:r>
-              <a:rPr lang="ru-RU" dirty="0" smtClean="0">
+              <a:rPr lang="ru-RU" dirty="0">
                 <a:ln>
                   <a:solidFill>
                     <a:schemeClr val="tx1"/>
@@ -8136,13 +8112,6 @@
               </a:rPr>
               <a:t> и заполнить его данными</a:t>
             </a:r>
-            <a:endParaRPr lang="ru-RU" dirty="0">
-              <a:ln>
-                <a:solidFill>
-                  <a:schemeClr val="tx1"/>
-                </a:solidFill>
-              </a:ln>
-            </a:endParaRPr>
           </a:p>
         </p:txBody>
       </p:sp>
@@ -8243,7 +8212,7 @@
           <a:p>
             <a:pPr algn="ctr"/>
             <a:r>
-              <a:rPr lang="ru-RU" dirty="0" smtClean="0">
+              <a:rPr lang="ru-RU" dirty="0">
                 <a:ln>
                   <a:solidFill>
                     <a:schemeClr val="tx1"/>
@@ -8253,7 +8222,7 @@
               <a:t>Экспорт файла </a:t>
             </a:r>
             <a:r>
-              <a:rPr lang="ru-RU" dirty="0" err="1" smtClean="0">
+              <a:rPr lang="ru-RU" dirty="0" err="1">
                 <a:ln>
                   <a:solidFill>
                     <a:schemeClr val="tx1"/>
@@ -8597,7 +8566,7 @@
           <a:p>
             <a:pPr algn="ctr"/>
             <a:r>
-              <a:rPr lang="ru-RU" dirty="0" smtClean="0">
+              <a:rPr lang="ru-RU" dirty="0">
                 <a:ln>
                   <a:solidFill>
                     <a:schemeClr val="tx1"/>
@@ -8606,13 +8575,6 @@
               </a:rPr>
               <a:t>Расчет биологических показателей</a:t>
             </a:r>
-            <a:endParaRPr lang="ru-RU" dirty="0">
-              <a:ln>
-                <a:solidFill>
-                  <a:schemeClr val="tx1"/>
-                </a:solidFill>
-              </a:ln>
-            </a:endParaRPr>
           </a:p>
         </p:txBody>
       </p:sp>
@@ -8661,7 +8623,7 @@
           <a:p>
             <a:pPr algn="ctr"/>
             <a:r>
-              <a:rPr lang="ru-RU" dirty="0" smtClean="0">
+              <a:rPr lang="ru-RU" dirty="0">
                 <a:ln>
                   <a:solidFill>
                     <a:schemeClr val="tx1"/>
@@ -8670,13 +8632,6 @@
               </a:rPr>
               <a:t>История вылова</a:t>
             </a:r>
-            <a:endParaRPr lang="ru-RU" dirty="0">
-              <a:ln>
-                <a:solidFill>
-                  <a:schemeClr val="tx1"/>
-                </a:solidFill>
-              </a:ln>
-            </a:endParaRPr>
           </a:p>
         </p:txBody>
       </p:sp>
@@ -8725,7 +8680,7 @@
           <a:p>
             <a:pPr algn="ctr"/>
             <a:r>
-              <a:rPr lang="ru-RU" dirty="0" smtClean="0">
+              <a:rPr lang="ru-RU" dirty="0">
                 <a:ln>
                   <a:solidFill>
                     <a:schemeClr val="tx1"/>
@@ -8734,13 +8689,6 @@
               </a:rPr>
               <a:t>Список таблиц</a:t>
             </a:r>
-            <a:endParaRPr lang="ru-RU" dirty="0">
-              <a:ln>
-                <a:solidFill>
-                  <a:schemeClr val="tx1"/>
-                </a:solidFill>
-              </a:ln>
-            </a:endParaRPr>
           </a:p>
         </p:txBody>
       </p:sp>
@@ -8791,7 +8739,7 @@
           <a:p>
             <a:pPr algn="ctr"/>
             <a:r>
-              <a:rPr lang="ru-RU" dirty="0" smtClean="0">
+              <a:rPr lang="ru-RU" dirty="0">
                 <a:ln>
                   <a:solidFill>
                     <a:schemeClr val="tx1"/>
@@ -8800,13 +8748,6 @@
               </a:rPr>
               <a:t>Получение квоты и выработки по введенным показателям </a:t>
             </a:r>
-            <a:endParaRPr lang="ru-RU" dirty="0">
-              <a:ln>
-                <a:solidFill>
-                  <a:schemeClr val="tx1"/>
-                </a:solidFill>
-              </a:ln>
-            </a:endParaRPr>
           </a:p>
         </p:txBody>
       </p:sp>
@@ -8824,7 +8765,7 @@
         </p:nvSpPr>
         <p:spPr>
           <a:xfrm>
-            <a:off x="7039971" y="313509"/>
+            <a:off x="7066118" y="329333"/>
             <a:ext cx="1633492" cy="1689462"/>
           </a:xfrm>
           <a:prstGeom prst="rect">
@@ -8859,30 +8800,20 @@
           <a:p>
             <a:pPr algn="ctr"/>
             <a:r>
-              <a:rPr lang="ru-RU" dirty="0" smtClean="0">
+              <a:rPr lang="ru-RU" dirty="0">
                 <a:ln>
                   <a:solidFill>
                     <a:schemeClr val="tx1"/>
                   </a:solidFill>
                 </a:ln>
               </a:rPr>
-              <a:t>Т</a:t>
-            </a:r>
-            <a:r>
-              <a:rPr lang="ru-RU" dirty="0" smtClean="0">
-                <a:ln>
-                  <a:solidFill>
-                    <a:schemeClr val="tx1"/>
-                  </a:solidFill>
-                </a:ln>
-              </a:rPr>
-              <a:t>аблицы Регистра</a:t>
-            </a:r>
-          </a:p>
-          <a:p>
-            <a:pPr algn="ctr"/>
-            <a:r>
-              <a:rPr lang="ru-RU" dirty="0" smtClean="0">
+              <a:t>Таблицы Регистра</a:t>
+            </a:r>
+          </a:p>
+          <a:p>
+            <a:pPr algn="ctr"/>
+            <a:r>
+              <a:rPr lang="ru-RU" dirty="0">
                 <a:ln>
                   <a:solidFill>
                     <a:schemeClr val="tx1"/>
@@ -8891,13 +8822,6 @@
               </a:rPr>
               <a:t>Таблица истории лова за прошлый год</a:t>
             </a:r>
-            <a:endParaRPr lang="ru-RU" dirty="0">
-              <a:ln>
-                <a:solidFill>
-                  <a:schemeClr val="tx1"/>
-                </a:solidFill>
-              </a:ln>
-            </a:endParaRPr>
           </a:p>
         </p:txBody>
       </p:sp>
@@ -9029,7 +8953,7 @@
           <a:p>
             <a:pPr algn="ctr"/>
             <a:r>
-              <a:rPr lang="ru-RU" dirty="0" smtClean="0">
+              <a:rPr lang="ru-RU" dirty="0">
                 <a:ln>
                   <a:solidFill>
                     <a:schemeClr val="tx1"/>
@@ -9038,13 +8962,6 @@
               </a:rPr>
               <a:t>Выбор вида, года, места вылова</a:t>
             </a:r>
-            <a:endParaRPr lang="ru-RU" dirty="0">
-              <a:ln>
-                <a:solidFill>
-                  <a:schemeClr val="tx1"/>
-                </a:solidFill>
-              </a:ln>
-            </a:endParaRPr>
           </a:p>
         </p:txBody>
       </p:sp>
@@ -9283,7 +9200,7 @@
           <a:p>
             <a:pPr algn="ctr"/>
             <a:r>
-              <a:rPr lang="ru-RU" dirty="0" smtClean="0">
+              <a:rPr lang="ru-RU" dirty="0">
                 <a:ln>
                   <a:solidFill>
                     <a:schemeClr val="tx1"/>
@@ -9292,13 +9209,6 @@
               </a:rPr>
               <a:t>Суммирование расчета вылова</a:t>
             </a:r>
-            <a:endParaRPr lang="ru-RU" dirty="0">
-              <a:ln>
-                <a:solidFill>
-                  <a:schemeClr val="tx1"/>
-                </a:solidFill>
-              </a:ln>
-            </a:endParaRPr>
           </a:p>
         </p:txBody>
       </p:sp>
@@ -9472,7 +9382,7 @@
           <a:p>
             <a:pPr algn="ctr"/>
             <a:r>
-              <a:rPr lang="ru-RU" dirty="0" smtClean="0">
+              <a:rPr lang="ru-RU" dirty="0">
                 <a:ln>
                   <a:solidFill>
                     <a:schemeClr val="tx1"/>
@@ -9482,7 +9392,7 @@
               <a:t>Расчет статистических </a:t>
             </a:r>
             <a:r>
-              <a:rPr lang="ru-RU" dirty="0" err="1" smtClean="0">
+              <a:rPr lang="ru-RU" dirty="0" err="1">
                 <a:ln>
                   <a:solidFill>
                     <a:schemeClr val="tx1"/>
@@ -9597,7 +9507,7 @@
           <a:p>
             <a:pPr algn="ctr"/>
             <a:r>
-              <a:rPr lang="ru-RU" dirty="0" smtClean="0">
+              <a:rPr lang="ru-RU" dirty="0">
                 <a:ln>
                   <a:solidFill>
                     <a:schemeClr val="tx1"/>
@@ -9606,13 +9516,6 @@
               </a:rPr>
               <a:t>Выбор вида и года</a:t>
             </a:r>
-            <a:endParaRPr lang="ru-RU" dirty="0">
-              <a:ln>
-                <a:solidFill>
-                  <a:schemeClr val="tx1"/>
-                </a:solidFill>
-              </a:ln>
-            </a:endParaRPr>
           </a:p>
         </p:txBody>
       </p:sp>
@@ -9760,7 +9663,7 @@
           <a:p>
             <a:pPr algn="ctr"/>
             <a:r>
-              <a:rPr lang="ru-RU" dirty="0" smtClean="0">
+              <a:rPr lang="ru-RU" dirty="0">
                 <a:ln>
                   <a:solidFill>
                     <a:schemeClr val="tx1"/>
@@ -9770,7 +9673,7 @@
               <a:t>Экспорт в </a:t>
             </a:r>
             <a:r>
-              <a:rPr lang="en-US" dirty="0" smtClean="0">
+              <a:rPr lang="en-US" dirty="0">
                 <a:ln>
                   <a:solidFill>
                     <a:schemeClr val="tx1"/>

</xml_diff>